<commit_message>
datasets and update slides
</commit_message>
<xml_diff>
--- a/powerpoint/UNIQ+Day3_students.pptx
+++ b/powerpoint/UNIQ+Day3_students.pptx
@@ -10,6 +10,7 @@
     <p:sldId id="290" r:id="rId4"/>
     <p:sldId id="286" r:id="rId5"/>
     <p:sldId id="285" r:id="rId6"/>
+    <p:sldId id="291" r:id="rId7"/>
   </p:sldIdLst>
   <p:sldSz cx="12192000" cy="6858000"/>
   <p:notesSz cx="6858000" cy="9144000"/>
@@ -7388,6 +7389,294 @@
           <a:p>
             <a:r>
               <a:rPr lang="en-US" dirty="0"/>
+              <a:t>Datasets for project</a:t>
+            </a:r>
+          </a:p>
+        </p:txBody>
+      </p:sp>
+      <p:sp>
+        <p:nvSpPr>
+          <p:cNvPr id="3" name="Content Placeholder 2">
+            <a:extLst>
+              <a:ext uri="{FF2B5EF4-FFF2-40B4-BE49-F238E27FC236}">
+                <a16:creationId xmlns:a16="http://schemas.microsoft.com/office/drawing/2014/main" id="{C1C9784C-C3D7-D44E-4617-D71B0680E490}"/>
+              </a:ext>
+            </a:extLst>
+          </p:cNvPr>
+          <p:cNvSpPr>
+            <a:spLocks noGrp="1"/>
+          </p:cNvSpPr>
+          <p:nvPr>
+            <p:ph idx="1"/>
+          </p:nvPr>
+        </p:nvSpPr>
+        <p:spPr/>
+        <p:txBody>
+          <a:bodyPr>
+            <a:normAutofit fontScale="77500" lnSpcReduction="20000"/>
+          </a:bodyPr>
+          <a:lstStyle/>
+          <a:p>
+            <a:r>
+              <a:rPr lang="en-US" dirty="0">
+                <a:highlight>
+                  <a:srgbClr val="00FF00"/>
+                </a:highlight>
+                <a:latin typeface="Calibri" panose="020F0502020204030204" pitchFamily="34" charset="0"/>
+                <a:cs typeface="Calibri" panose="020F0502020204030204" pitchFamily="34" charset="0"/>
+              </a:rPr>
+              <a:t>Best songs on Spotify (</a:t>
+            </a:r>
+            <a:r>
+              <a:rPr lang="en-US" dirty="0" err="1">
+                <a:highlight>
+                  <a:srgbClr val="00FF00"/>
+                </a:highlight>
+                <a:latin typeface="Calibri" panose="020F0502020204030204" pitchFamily="34" charset="0"/>
+                <a:cs typeface="Calibri" panose="020F0502020204030204" pitchFamily="34" charset="0"/>
+              </a:rPr>
+              <a:t>headstart</a:t>
+            </a:r>
+            <a:r>
+              <a:rPr lang="en-US" dirty="0">
+                <a:highlight>
+                  <a:srgbClr val="00FF00"/>
+                </a:highlight>
+                <a:latin typeface="Calibri" panose="020F0502020204030204" pitchFamily="34" charset="0"/>
+                <a:cs typeface="Calibri" panose="020F0502020204030204" pitchFamily="34" charset="0"/>
+              </a:rPr>
+              <a:t>)</a:t>
+            </a:r>
+          </a:p>
+          <a:p>
+            <a:r>
+              <a:rPr lang="en-US" dirty="0">
+                <a:highlight>
+                  <a:srgbClr val="00FF00"/>
+                </a:highlight>
+                <a:latin typeface="Calibri" panose="020F0502020204030204" pitchFamily="34" charset="0"/>
+                <a:cs typeface="Calibri" panose="020F0502020204030204" pitchFamily="34" charset="0"/>
+              </a:rPr>
+              <a:t>Student mental health (</a:t>
+            </a:r>
+            <a:r>
+              <a:rPr lang="en-US" dirty="0" err="1">
+                <a:highlight>
+                  <a:srgbClr val="00FF00"/>
+                </a:highlight>
+                <a:latin typeface="Calibri" panose="020F0502020204030204" pitchFamily="34" charset="0"/>
+                <a:cs typeface="Calibri" panose="020F0502020204030204" pitchFamily="34" charset="0"/>
+              </a:rPr>
+              <a:t>headstart</a:t>
+            </a:r>
+            <a:r>
+              <a:rPr lang="en-US" dirty="0">
+                <a:highlight>
+                  <a:srgbClr val="00FF00"/>
+                </a:highlight>
+                <a:latin typeface="Calibri" panose="020F0502020204030204" pitchFamily="34" charset="0"/>
+                <a:cs typeface="Calibri" panose="020F0502020204030204" pitchFamily="34" charset="0"/>
+              </a:rPr>
+              <a:t>)</a:t>
+            </a:r>
+          </a:p>
+          <a:p>
+            <a:r>
+              <a:rPr lang="en-US" dirty="0">
+                <a:highlight>
+                  <a:srgbClr val="00FF00"/>
+                </a:highlight>
+                <a:latin typeface="Calibri" panose="020F0502020204030204" pitchFamily="34" charset="0"/>
+                <a:cs typeface="Calibri" panose="020F0502020204030204" pitchFamily="34" charset="0"/>
+              </a:rPr>
+              <a:t>Diabetes (</a:t>
+            </a:r>
+            <a:r>
+              <a:rPr lang="en-US" dirty="0" err="1">
+                <a:highlight>
+                  <a:srgbClr val="00FF00"/>
+                </a:highlight>
+                <a:latin typeface="Calibri" panose="020F0502020204030204" pitchFamily="34" charset="0"/>
+                <a:cs typeface="Calibri" panose="020F0502020204030204" pitchFamily="34" charset="0"/>
+              </a:rPr>
+              <a:t>headstart</a:t>
+            </a:r>
+            <a:r>
+              <a:rPr lang="en-US" dirty="0">
+                <a:highlight>
+                  <a:srgbClr val="00FF00"/>
+                </a:highlight>
+                <a:latin typeface="Calibri" panose="020F0502020204030204" pitchFamily="34" charset="0"/>
+                <a:cs typeface="Calibri" panose="020F0502020204030204" pitchFamily="34" charset="0"/>
+              </a:rPr>
+              <a:t>)</a:t>
+            </a:r>
+          </a:p>
+          <a:p>
+            <a:endParaRPr lang="en-US" dirty="0">
+              <a:latin typeface="Calibri" panose="020F0502020204030204" pitchFamily="34" charset="0"/>
+              <a:cs typeface="Calibri" panose="020F0502020204030204" pitchFamily="34" charset="0"/>
+            </a:endParaRPr>
+          </a:p>
+          <a:p>
+            <a:r>
+              <a:rPr lang="en-US" dirty="0">
+                <a:highlight>
+                  <a:srgbClr val="00FFFF"/>
+                </a:highlight>
+                <a:latin typeface="Calibri" panose="020F0502020204030204" pitchFamily="34" charset="0"/>
+                <a:cs typeface="Calibri" panose="020F0502020204030204" pitchFamily="34" charset="0"/>
+              </a:rPr>
+              <a:t>US births</a:t>
+            </a:r>
+          </a:p>
+          <a:p>
+            <a:r>
+              <a:rPr lang="en-US" dirty="0">
+                <a:highlight>
+                  <a:srgbClr val="00FFFF"/>
+                </a:highlight>
+                <a:latin typeface="Calibri" panose="020F0502020204030204" pitchFamily="34" charset="0"/>
+                <a:cs typeface="Calibri" panose="020F0502020204030204" pitchFamily="34" charset="0"/>
+              </a:rPr>
+              <a:t>Glass Door Gender Pay</a:t>
+            </a:r>
+          </a:p>
+          <a:p>
+            <a:r>
+              <a:rPr lang="en-US" dirty="0">
+                <a:highlight>
+                  <a:srgbClr val="00FFFF"/>
+                </a:highlight>
+                <a:latin typeface="Calibri" panose="020F0502020204030204" pitchFamily="34" charset="0"/>
+                <a:cs typeface="Calibri" panose="020F0502020204030204" pitchFamily="34" charset="0"/>
+              </a:rPr>
+              <a:t>WHO Life Expectancy</a:t>
+            </a:r>
+          </a:p>
+          <a:p>
+            <a:endParaRPr lang="en-US" dirty="0">
+              <a:latin typeface="Calibri" panose="020F0502020204030204" pitchFamily="34" charset="0"/>
+              <a:cs typeface="Calibri" panose="020F0502020204030204" pitchFamily="34" charset="0"/>
+            </a:endParaRPr>
+          </a:p>
+          <a:p>
+            <a:r>
+              <a:rPr lang="en-US" dirty="0">
+                <a:highlight>
+                  <a:srgbClr val="FF00FF"/>
+                </a:highlight>
+                <a:latin typeface="Calibri" panose="020F0502020204030204" pitchFamily="34" charset="0"/>
+                <a:cs typeface="Calibri" panose="020F0502020204030204" pitchFamily="34" charset="0"/>
+              </a:rPr>
+              <a:t>UFO sightings (Excel file – either save as .csv in Excel an then load into R, or load the Excel file directly into R using the </a:t>
+            </a:r>
+            <a:r>
+              <a:rPr lang="en-US" dirty="0" err="1">
+                <a:highlight>
+                  <a:srgbClr val="FF00FF"/>
+                </a:highlight>
+                <a:latin typeface="Calibri" panose="020F0502020204030204" pitchFamily="34" charset="0"/>
+                <a:cs typeface="Calibri" panose="020F0502020204030204" pitchFamily="34" charset="0"/>
+              </a:rPr>
+              <a:t>readxl</a:t>
+            </a:r>
+            <a:r>
+              <a:rPr lang="en-US" dirty="0">
+                <a:highlight>
+                  <a:srgbClr val="FF00FF"/>
+                </a:highlight>
+                <a:latin typeface="Calibri" panose="020F0502020204030204" pitchFamily="34" charset="0"/>
+                <a:cs typeface="Calibri" panose="020F0502020204030204" pitchFamily="34" charset="0"/>
+              </a:rPr>
+              <a:t> package)</a:t>
+            </a:r>
+          </a:p>
+          <a:p>
+            <a:r>
+              <a:rPr lang="en-US" dirty="0">
+                <a:highlight>
+                  <a:srgbClr val="FF00FF"/>
+                </a:highlight>
+                <a:latin typeface="Calibri" panose="020F0502020204030204" pitchFamily="34" charset="0"/>
+                <a:cs typeface="Calibri" panose="020F0502020204030204" pitchFamily="34" charset="0"/>
+              </a:rPr>
+              <a:t>Bladder cancer (3 files)</a:t>
+            </a:r>
+          </a:p>
+          <a:p>
+            <a:r>
+              <a:rPr lang="en-US" dirty="0">
+                <a:highlight>
+                  <a:srgbClr val="FF00FF"/>
+                </a:highlight>
+                <a:latin typeface="Calibri" panose="020F0502020204030204" pitchFamily="34" charset="0"/>
+                <a:cs typeface="Calibri" panose="020F0502020204030204" pitchFamily="34" charset="0"/>
+              </a:rPr>
+              <a:t>Fitbit (2 files)</a:t>
+            </a:r>
+          </a:p>
+          <a:p>
+            <a:endParaRPr lang="en-US" dirty="0">
+              <a:latin typeface="Courier New" panose="02070309020205020404" pitchFamily="49" charset="0"/>
+              <a:cs typeface="Courier New" panose="02070309020205020404" pitchFamily="49" charset="0"/>
+            </a:endParaRPr>
+          </a:p>
+        </p:txBody>
+      </p:sp>
+    </p:spTree>
+    <p:extLst>
+      <p:ext uri="{BB962C8B-B14F-4D97-AF65-F5344CB8AC3E}">
+        <p14:creationId xmlns:p14="http://schemas.microsoft.com/office/powerpoint/2010/main" val="4268945086"/>
+      </p:ext>
+    </p:extLst>
+  </p:cSld>
+  <p:clrMapOvr>
+    <a:masterClrMapping/>
+  </p:clrMapOvr>
+</p:sld>
+</file>
+
+<file path=ppt/slides/slide6.xml><?xml version="1.0" encoding="utf-8"?>
+<p:sld xmlns:a="http://schemas.openxmlformats.org/drawingml/2006/main" xmlns:r="http://schemas.openxmlformats.org/officeDocument/2006/relationships" xmlns:p="http://schemas.openxmlformats.org/presentationml/2006/main">
+  <p:cSld>
+    <p:spTree>
+      <p:nvGrpSpPr>
+        <p:cNvPr id="1" name=""/>
+        <p:cNvGrpSpPr/>
+        <p:nvPr/>
+      </p:nvGrpSpPr>
+      <p:grpSpPr>
+        <a:xfrm>
+          <a:off x="0" y="0"/>
+          <a:ext cx="0" cy="0"/>
+          <a:chOff x="0" y="0"/>
+          <a:chExt cx="0" cy="0"/>
+        </a:xfrm>
+      </p:grpSpPr>
+      <p:sp>
+        <p:nvSpPr>
+          <p:cNvPr id="2" name="Title 1">
+            <a:extLst>
+              <a:ext uri="{FF2B5EF4-FFF2-40B4-BE49-F238E27FC236}">
+                <a16:creationId xmlns:a16="http://schemas.microsoft.com/office/drawing/2014/main" id="{9DDDE6BA-9E55-BFBE-F57B-6BA059D71CB8}"/>
+              </a:ext>
+            </a:extLst>
+          </p:cNvPr>
+          <p:cNvSpPr>
+            <a:spLocks noGrp="1"/>
+          </p:cNvSpPr>
+          <p:nvPr>
+            <p:ph type="title"/>
+          </p:nvPr>
+        </p:nvSpPr>
+        <p:spPr/>
+        <p:txBody>
+          <a:bodyPr/>
+          <a:lstStyle/>
+          <a:p>
+            <a:r>
+              <a:rPr lang="en-US" dirty="0"/>
               <a:t>Loop functions</a:t>
             </a:r>
           </a:p>
@@ -7497,7 +7786,7 @@
     </p:spTree>
     <p:extLst>
       <p:ext uri="{BB962C8B-B14F-4D97-AF65-F5344CB8AC3E}">
-        <p14:creationId xmlns:p14="http://schemas.microsoft.com/office/powerpoint/2010/main" val="4268945086"/>
+        <p14:creationId xmlns:p14="http://schemas.microsoft.com/office/powerpoint/2010/main" val="216316732"/>
       </p:ext>
     </p:extLst>
   </p:cSld>

</xml_diff>